<commit_message>
Variata un'icona nel PPTX
</commit_message>
<xml_diff>
--- a/presentation/presentazione-formalms.pptx
+++ b/presentation/presentazione-formalms.pptx
@@ -7825,7 +7825,7 @@
       </p:sp>
       <p:pic>
         <p:nvPicPr>
-          <p:cNvPr id="6" name="Segnaposto contenuto 5" descr="Download dal cloud">
+          <p:cNvPr id="6" name="Segnaposto contenuto 5">
             <a:extLst>
               <a:ext uri="{FF2B5EF4-FFF2-40B4-BE49-F238E27FC236}">
                 <a16:creationId xmlns:a16="http://schemas.microsoft.com/office/drawing/2014/main" id="{0271AC64-7E46-4584-94B4-CF13842EACEB}"/>
@@ -7844,9 +7844,6 @@
             <a:extLst>
               <a:ext uri="{28A0092B-C50C-407E-A947-70E740481C1C}">
                 <a14:useLocalDpi xmlns:a14="http://schemas.microsoft.com/office/drawing/2010/main" val="0"/>
-              </a:ext>
-              <a:ext uri="{96DAC541-7B7A-43D3-8B79-37D633B846F1}">
-                <asvg:svgBlip xmlns:asvg="http://schemas.microsoft.com/office/drawing/2016/SVG/main" r:embed="rId3"/>
               </a:ext>
             </a:extLst>
           </a:blip>

</xml_diff>